<commit_message>
Minor Changes in original PPT
</commit_message>
<xml_diff>
--- a/IoTProject_CollegeLibraryVisitors/SpecificationDocuments/ABC Of IoT And Proposed Project.pptx
+++ b/IoTProject_CollegeLibraryVisitors/SpecificationDocuments/ABC Of IoT And Proposed Project.pptx
@@ -9542,7 +9542,7 @@
                 <a:latin typeface="MV Boli" panose="02000500030200090000" charset="0"/>
                 <a:cs typeface="MV Boli" panose="02000500030200090000" charset="0"/>
               </a:rPr>
-              <a:t>Thank You!!</a:t>
+              <a:t>Thank You!</a:t>
             </a:r>
             <a:endParaRPr lang="en-US" sz="6600" b="1">
               <a:solidFill>
@@ -9678,7 +9678,7 @@
         </p:nvSpPr>
         <p:spPr>
           <a:xfrm>
-            <a:off x="893445" y="3442335"/>
+            <a:off x="982980" y="3330575"/>
             <a:ext cx="4838065" cy="460375"/>
           </a:xfrm>
           <a:prstGeom prst="rect">

</xml_diff>